<commit_message>
Add Final Eval Ppt
</commit_message>
<xml_diff>
--- a/09 - Midterm Evaluation/Midterm Evaluation Slides - Final Draft.pptx
+++ b/09 - Midterm Evaluation/Midterm Evaluation Slides - Final Draft.pptx
@@ -215,7 +215,7 @@
           <a:p>
             <a:fld id="{EF96ACE9-C9FC-4287-B6B2-A985566C0C1D}" type="datetimeFigureOut">
               <a:rPr lang="en-US" smtClean="0"/>
-              <a:t>12/11/2024</a:t>
+              <a:t>2/14/2025</a:t>
             </a:fld>
             <a:endParaRPr lang="en-US"/>
           </a:p>
@@ -606,7 +606,7 @@
           <a:p>
             <a:fld id="{586E079D-FA02-4D7C-A067-025B69BED90B}" type="datetime1">
               <a:rPr lang="en-US" smtClean="0"/>
-              <a:t>12/11/2024</a:t>
+              <a:t>2/14/2025</a:t>
             </a:fld>
             <a:endParaRPr lang="en-US"/>
           </a:p>
@@ -769,7 +769,7 @@
           <a:p>
             <a:fld id="{6D7522E9-98FD-4107-9492-08DFF93C6D24}" type="datetime1">
               <a:rPr lang="en-US" smtClean="0"/>
-              <a:t>12/11/2024</a:t>
+              <a:t>2/14/2025</a:t>
             </a:fld>
             <a:endParaRPr lang="en-US"/>
           </a:p>
@@ -942,7 +942,7 @@
           <a:p>
             <a:fld id="{64F554E4-DA44-4B32-87BE-D7B31E3ECA58}" type="datetime1">
               <a:rPr lang="en-US" smtClean="0"/>
-              <a:t>12/11/2024</a:t>
+              <a:t>2/14/2025</a:t>
             </a:fld>
             <a:endParaRPr lang="en-US"/>
           </a:p>
@@ -1105,7 +1105,7 @@
           <a:p>
             <a:fld id="{F8F961F9-3228-4C84-B7EB-9F8A722527A0}" type="datetime1">
               <a:rPr lang="en-US" smtClean="0"/>
-              <a:t>12/11/2024</a:t>
+              <a:t>2/14/2025</a:t>
             </a:fld>
             <a:endParaRPr lang="en-US"/>
           </a:p>
@@ -1353,7 +1353,7 @@
           <a:p>
             <a:fld id="{73A0622A-4FB7-4F38-AFAB-76F70168B3E8}" type="datetime1">
               <a:rPr lang="en-US" smtClean="0"/>
-              <a:t>12/11/2024</a:t>
+              <a:t>2/14/2025</a:t>
             </a:fld>
             <a:endParaRPr lang="en-US"/>
           </a:p>
@@ -1577,7 +1577,7 @@
           <a:p>
             <a:fld id="{CC0056DD-091F-4BC0-AA2B-F6BC69D80646}" type="datetime1">
               <a:rPr lang="en-US" smtClean="0"/>
-              <a:t>12/11/2024</a:t>
+              <a:t>2/14/2025</a:t>
             </a:fld>
             <a:endParaRPr lang="en-US"/>
           </a:p>
@@ -1936,7 +1936,7 @@
           <a:p>
             <a:fld id="{83585785-5EDB-4737-A101-54392E9630A0}" type="datetime1">
               <a:rPr lang="en-US" smtClean="0"/>
-              <a:t>12/11/2024</a:t>
+              <a:t>2/14/2025</a:t>
             </a:fld>
             <a:endParaRPr lang="en-US"/>
           </a:p>
@@ -2048,7 +2048,7 @@
           <a:p>
             <a:fld id="{51DC2124-0584-42D9-98DF-2C781C7767AD}" type="datetime1">
               <a:rPr lang="en-US" smtClean="0"/>
-              <a:t>12/11/2024</a:t>
+              <a:t>2/14/2025</a:t>
             </a:fld>
             <a:endParaRPr lang="en-US"/>
           </a:p>
@@ -2138,7 +2138,7 @@
           <a:p>
             <a:fld id="{04579D91-6D40-4365-B913-ABC87F070EFF}" type="datetime1">
               <a:rPr lang="en-US" smtClean="0"/>
-              <a:t>12/11/2024</a:t>
+              <a:t>2/14/2025</a:t>
             </a:fld>
             <a:endParaRPr lang="en-US"/>
           </a:p>
@@ -2408,7 +2408,7 @@
           <a:p>
             <a:fld id="{9B030D12-A29D-4657-A570-DED5763DBAB4}" type="datetime1">
               <a:rPr lang="en-US" smtClean="0"/>
-              <a:t>12/11/2024</a:t>
+              <a:t>2/14/2025</a:t>
             </a:fld>
             <a:endParaRPr lang="en-US"/>
           </a:p>
@@ -2655,7 +2655,7 @@
           <a:p>
             <a:fld id="{3521DB1F-5EC7-49FD-BD5D-D2AECE211981}" type="datetime1">
               <a:rPr lang="en-US" smtClean="0"/>
-              <a:t>12/11/2024</a:t>
+              <a:t>2/14/2025</a:t>
             </a:fld>
             <a:endParaRPr lang="en-US"/>
           </a:p>
@@ -2861,7 +2861,7 @@
           <a:p>
             <a:fld id="{DCC94D58-688E-4B09-A302-FBEE63827EDE}" type="datetime1">
               <a:rPr lang="en-US" smtClean="0"/>
-              <a:t>12/11/2024</a:t>
+              <a:t>2/14/2025</a:t>
             </a:fld>
             <a:endParaRPr lang="en-US"/>
           </a:p>
@@ -3274,7 +3274,7 @@
         </p:nvSpPr>
         <p:spPr>
           <a:xfrm>
-            <a:off x="1524000" y="1840342"/>
+            <a:off x="1689100" y="239886"/>
             <a:ext cx="9144000" cy="1330575"/>
           </a:xfrm>
         </p:spPr>

</xml_diff>